<commit_message>
updates for intro and neuron slides
</commit_message>
<xml_diff>
--- a/ccn/randy_slides/oreilly_ccn_intro.pptx
+++ b/ccn/randy_slides/oreilly_ccn_intro.pptx
@@ -191,6 +191,25 @@
       </a:defRPr>
     </a:lvl9pPr>
   </p:defaultTextStyle>
+  <p:extLst>
+    <p:ext uri="{EFAFB233-063F-42B5-8137-9DF3F51BA10A}">
+      <p15:sldGuideLst xmlns:p15="http://schemas.microsoft.com/office/powerpoint/2012/main">
+        <p15:guide id="1" orient="horz" pos="2382">
+          <p15:clr>
+            <a:srgbClr val="A4A3A4"/>
+          </p15:clr>
+        </p15:guide>
+        <p15:guide id="2" pos="3174">
+          <p15:clr>
+            <a:srgbClr val="A4A3A4"/>
+          </p15:clr>
+        </p15:guide>
+      </p15:sldGuideLst>
+    </p:ext>
+    <p:ext uri="{2D200454-40CA-4A62-9FC3-DE9A4176ACB9}">
+      <p15:notesGuideLst xmlns:p15="http://schemas.microsoft.com/office/powerpoint/2012/main"/>
+    </p:ext>
+  </p:extLst>
 </p:presentation>
 </file>
 
@@ -276,7 +295,7 @@
           <a:p>
             <a:fld id="{B30C99ED-B25D-C748-886A-20A01D83602A}" type="datetimeFigureOut">
               <a:rPr lang="en-US" smtClean="0"/>
-              <a:t>1/14/14</a:t>
+              <a:t>4/2/20</a:t>
             </a:fld>
             <a:endParaRPr lang="en-US"/>
           </a:p>
@@ -889,10 +908,9 @@
           <a:lstStyle/>
           <a:p>
             <a:r>
-              <a:rPr lang="en-US" smtClean="0"/>
+              <a:rPr lang="en-US"/>
               <a:t>Click to edit Master title style</a:t>
             </a:r>
-            <a:endParaRPr lang="en-US"/>
           </a:p>
         </p:txBody>
       </p:sp>
@@ -954,10 +972,9 @@
           </a:lstStyle>
           <a:p>
             <a:r>
-              <a:rPr lang="en-US" smtClean="0"/>
+              <a:rPr lang="en-US"/>
               <a:t>Click to edit Master subtitle style</a:t>
             </a:r>
-            <a:endParaRPr lang="en-US"/>
           </a:p>
         </p:txBody>
       </p:sp>
@@ -1076,10 +1093,9 @@
           <a:lstStyle/>
           <a:p>
             <a:r>
-              <a:rPr lang="en-US" smtClean="0"/>
+              <a:rPr lang="en-US"/>
               <a:t>Click to edit Master title style</a:t>
             </a:r>
-            <a:endParaRPr lang="en-US"/>
           </a:p>
         </p:txBody>
       </p:sp>
@@ -1100,38 +1116,37 @@
           <a:p>
             <a:pPr lvl="0"/>
             <a:r>
-              <a:rPr lang="en-US" smtClean="0"/>
+              <a:rPr lang="en-US"/>
               <a:t>Click to edit Master text styles</a:t>
             </a:r>
           </a:p>
           <a:p>
             <a:pPr lvl="1"/>
             <a:r>
-              <a:rPr lang="en-US" smtClean="0"/>
+              <a:rPr lang="en-US"/>
               <a:t>Second level</a:t>
             </a:r>
           </a:p>
           <a:p>
             <a:pPr lvl="2"/>
             <a:r>
-              <a:rPr lang="en-US" smtClean="0"/>
+              <a:rPr lang="en-US"/>
               <a:t>Third level</a:t>
             </a:r>
           </a:p>
           <a:p>
             <a:pPr lvl="3"/>
             <a:r>
-              <a:rPr lang="en-US" smtClean="0"/>
+              <a:rPr lang="en-US"/>
               <a:t>Fourth level</a:t>
             </a:r>
           </a:p>
           <a:p>
             <a:pPr lvl="4"/>
             <a:r>
-              <a:rPr lang="en-US" smtClean="0"/>
+              <a:rPr lang="en-US"/>
               <a:t>Fifth level</a:t>
             </a:r>
-            <a:endParaRPr lang="en-US"/>
           </a:p>
         </p:txBody>
       </p:sp>
@@ -1255,10 +1270,9 @@
           <a:lstStyle/>
           <a:p>
             <a:r>
-              <a:rPr lang="en-US" smtClean="0"/>
+              <a:rPr lang="en-US"/>
               <a:t>Click to edit Master title style</a:t>
             </a:r>
-            <a:endParaRPr lang="en-US"/>
           </a:p>
         </p:txBody>
       </p:sp>
@@ -1284,38 +1298,37 @@
           <a:p>
             <a:pPr lvl="0"/>
             <a:r>
-              <a:rPr lang="en-US" smtClean="0"/>
+              <a:rPr lang="en-US"/>
               <a:t>Click to edit Master text styles</a:t>
             </a:r>
           </a:p>
           <a:p>
             <a:pPr lvl="1"/>
             <a:r>
-              <a:rPr lang="en-US" smtClean="0"/>
+              <a:rPr lang="en-US"/>
               <a:t>Second level</a:t>
             </a:r>
           </a:p>
           <a:p>
             <a:pPr lvl="2"/>
             <a:r>
-              <a:rPr lang="en-US" smtClean="0"/>
+              <a:rPr lang="en-US"/>
               <a:t>Third level</a:t>
             </a:r>
           </a:p>
           <a:p>
             <a:pPr lvl="3"/>
             <a:r>
-              <a:rPr lang="en-US" smtClean="0"/>
+              <a:rPr lang="en-US"/>
               <a:t>Fourth level</a:t>
             </a:r>
           </a:p>
           <a:p>
             <a:pPr lvl="4"/>
             <a:r>
-              <a:rPr lang="en-US" smtClean="0"/>
+              <a:rPr lang="en-US"/>
               <a:t>Fifth level</a:t>
             </a:r>
-            <a:endParaRPr lang="en-US"/>
           </a:p>
         </p:txBody>
       </p:sp>
@@ -1434,10 +1447,9 @@
           <a:lstStyle/>
           <a:p>
             <a:r>
-              <a:rPr lang="en-US" smtClean="0"/>
+              <a:rPr lang="en-US"/>
               <a:t>Click to edit Master title style</a:t>
             </a:r>
-            <a:endParaRPr lang="en-US"/>
           </a:p>
         </p:txBody>
       </p:sp>
@@ -1458,38 +1470,37 @@
           <a:p>
             <a:pPr lvl="0"/>
             <a:r>
-              <a:rPr lang="en-US" smtClean="0"/>
+              <a:rPr lang="en-US"/>
               <a:t>Click to edit Master text styles</a:t>
             </a:r>
           </a:p>
           <a:p>
             <a:pPr lvl="1"/>
             <a:r>
-              <a:rPr lang="en-US" smtClean="0"/>
+              <a:rPr lang="en-US"/>
               <a:t>Second level</a:t>
             </a:r>
           </a:p>
           <a:p>
             <a:pPr lvl="2"/>
             <a:r>
-              <a:rPr lang="en-US" smtClean="0"/>
+              <a:rPr lang="en-US"/>
               <a:t>Third level</a:t>
             </a:r>
           </a:p>
           <a:p>
             <a:pPr lvl="3"/>
             <a:r>
-              <a:rPr lang="en-US" smtClean="0"/>
+              <a:rPr lang="en-US"/>
               <a:t>Fourth level</a:t>
             </a:r>
           </a:p>
           <a:p>
             <a:pPr lvl="4"/>
             <a:r>
-              <a:rPr lang="en-US" smtClean="0"/>
+              <a:rPr lang="en-US"/>
               <a:t>Fifth level</a:t>
             </a:r>
-            <a:endParaRPr lang="en-US"/>
           </a:p>
         </p:txBody>
       </p:sp>
@@ -1617,10 +1628,9 @@
           </a:lstStyle>
           <a:p>
             <a:r>
-              <a:rPr lang="en-US" smtClean="0"/>
+              <a:rPr lang="en-US"/>
               <a:t>Click to edit Master title style</a:t>
             </a:r>
-            <a:endParaRPr lang="en-US"/>
           </a:p>
         </p:txBody>
       </p:sp>
@@ -1683,7 +1693,7 @@
           <a:p>
             <a:pPr lvl="0"/>
             <a:r>
-              <a:rPr lang="en-US" smtClean="0"/>
+              <a:rPr lang="en-US"/>
               <a:t>Click to edit Master text styles</a:t>
             </a:r>
           </a:p>
@@ -1804,10 +1814,9 @@
           <a:lstStyle/>
           <a:p>
             <a:r>
-              <a:rPr lang="en-US" smtClean="0"/>
+              <a:rPr lang="en-US"/>
               <a:t>Click to edit Master title style</a:t>
             </a:r>
-            <a:endParaRPr lang="en-US"/>
           </a:p>
         </p:txBody>
       </p:sp>
@@ -1861,38 +1870,37 @@
           <a:p>
             <a:pPr lvl="0"/>
             <a:r>
-              <a:rPr lang="en-US" smtClean="0"/>
+              <a:rPr lang="en-US"/>
               <a:t>Click to edit Master text styles</a:t>
             </a:r>
           </a:p>
           <a:p>
             <a:pPr lvl="1"/>
             <a:r>
-              <a:rPr lang="en-US" smtClean="0"/>
+              <a:rPr lang="en-US"/>
               <a:t>Second level</a:t>
             </a:r>
           </a:p>
           <a:p>
             <a:pPr lvl="2"/>
             <a:r>
-              <a:rPr lang="en-US" smtClean="0"/>
+              <a:rPr lang="en-US"/>
               <a:t>Third level</a:t>
             </a:r>
           </a:p>
           <a:p>
             <a:pPr lvl="3"/>
             <a:r>
-              <a:rPr lang="en-US" smtClean="0"/>
+              <a:rPr lang="en-US"/>
               <a:t>Fourth level</a:t>
             </a:r>
           </a:p>
           <a:p>
             <a:pPr lvl="4"/>
             <a:r>
-              <a:rPr lang="en-US" smtClean="0"/>
+              <a:rPr lang="en-US"/>
               <a:t>Fifth level</a:t>
             </a:r>
-            <a:endParaRPr lang="en-US"/>
           </a:p>
         </p:txBody>
       </p:sp>
@@ -1946,38 +1954,37 @@
           <a:p>
             <a:pPr lvl="0"/>
             <a:r>
-              <a:rPr lang="en-US" smtClean="0"/>
+              <a:rPr lang="en-US"/>
               <a:t>Click to edit Master text styles</a:t>
             </a:r>
           </a:p>
           <a:p>
             <a:pPr lvl="1"/>
             <a:r>
-              <a:rPr lang="en-US" smtClean="0"/>
+              <a:rPr lang="en-US"/>
               <a:t>Second level</a:t>
             </a:r>
           </a:p>
           <a:p>
             <a:pPr lvl="2"/>
             <a:r>
-              <a:rPr lang="en-US" smtClean="0"/>
+              <a:rPr lang="en-US"/>
               <a:t>Third level</a:t>
             </a:r>
           </a:p>
           <a:p>
             <a:pPr lvl="3"/>
             <a:r>
-              <a:rPr lang="en-US" smtClean="0"/>
+              <a:rPr lang="en-US"/>
               <a:t>Fourth level</a:t>
             </a:r>
           </a:p>
           <a:p>
             <a:pPr lvl="4"/>
             <a:r>
-              <a:rPr lang="en-US" smtClean="0"/>
+              <a:rPr lang="en-US"/>
               <a:t>Fifth level</a:t>
             </a:r>
-            <a:endParaRPr lang="en-US"/>
           </a:p>
         </p:txBody>
       </p:sp>
@@ -2105,10 +2112,9 @@
           </a:lstStyle>
           <a:p>
             <a:r>
-              <a:rPr lang="en-US" smtClean="0"/>
+              <a:rPr lang="en-US"/>
               <a:t>Click to edit Master title style</a:t>
             </a:r>
-            <a:endParaRPr lang="en-US"/>
           </a:p>
         </p:txBody>
       </p:sp>
@@ -2171,7 +2177,7 @@
           <a:p>
             <a:pPr lvl="0"/>
             <a:r>
-              <a:rPr lang="en-US" smtClean="0"/>
+              <a:rPr lang="en-US"/>
               <a:t>Click to edit Master text styles</a:t>
             </a:r>
           </a:p>
@@ -2227,38 +2233,37 @@
           <a:p>
             <a:pPr lvl="0"/>
             <a:r>
-              <a:rPr lang="en-US" smtClean="0"/>
+              <a:rPr lang="en-US"/>
               <a:t>Click to edit Master text styles</a:t>
             </a:r>
           </a:p>
           <a:p>
             <a:pPr lvl="1"/>
             <a:r>
-              <a:rPr lang="en-US" smtClean="0"/>
+              <a:rPr lang="en-US"/>
               <a:t>Second level</a:t>
             </a:r>
           </a:p>
           <a:p>
             <a:pPr lvl="2"/>
             <a:r>
-              <a:rPr lang="en-US" smtClean="0"/>
+              <a:rPr lang="en-US"/>
               <a:t>Third level</a:t>
             </a:r>
           </a:p>
           <a:p>
             <a:pPr lvl="3"/>
             <a:r>
-              <a:rPr lang="en-US" smtClean="0"/>
+              <a:rPr lang="en-US"/>
               <a:t>Fourth level</a:t>
             </a:r>
           </a:p>
           <a:p>
             <a:pPr lvl="4"/>
             <a:r>
-              <a:rPr lang="en-US" smtClean="0"/>
+              <a:rPr lang="en-US"/>
               <a:t>Fifth level</a:t>
             </a:r>
-            <a:endParaRPr lang="en-US"/>
           </a:p>
         </p:txBody>
       </p:sp>
@@ -2321,7 +2326,7 @@
           <a:p>
             <a:pPr lvl="0"/>
             <a:r>
-              <a:rPr lang="en-US" smtClean="0"/>
+              <a:rPr lang="en-US"/>
               <a:t>Click to edit Master text styles</a:t>
             </a:r>
           </a:p>
@@ -2377,38 +2382,37 @@
           <a:p>
             <a:pPr lvl="0"/>
             <a:r>
-              <a:rPr lang="en-US" smtClean="0"/>
+              <a:rPr lang="en-US"/>
               <a:t>Click to edit Master text styles</a:t>
             </a:r>
           </a:p>
           <a:p>
             <a:pPr lvl="1"/>
             <a:r>
-              <a:rPr lang="en-US" smtClean="0"/>
+              <a:rPr lang="en-US"/>
               <a:t>Second level</a:t>
             </a:r>
           </a:p>
           <a:p>
             <a:pPr lvl="2"/>
             <a:r>
-              <a:rPr lang="en-US" smtClean="0"/>
+              <a:rPr lang="en-US"/>
               <a:t>Third level</a:t>
             </a:r>
           </a:p>
           <a:p>
             <a:pPr lvl="3"/>
             <a:r>
-              <a:rPr lang="en-US" smtClean="0"/>
+              <a:rPr lang="en-US"/>
               <a:t>Fourth level</a:t>
             </a:r>
           </a:p>
           <a:p>
             <a:pPr lvl="4"/>
             <a:r>
-              <a:rPr lang="en-US" smtClean="0"/>
+              <a:rPr lang="en-US"/>
               <a:t>Fifth level</a:t>
             </a:r>
-            <a:endParaRPr lang="en-US"/>
           </a:p>
         </p:txBody>
       </p:sp>
@@ -2527,10 +2531,9 @@
           <a:lstStyle/>
           <a:p>
             <a:r>
-              <a:rPr lang="en-US" smtClean="0"/>
+              <a:rPr lang="en-US"/>
               <a:t>Click to edit Master title style</a:t>
             </a:r>
-            <a:endParaRPr lang="en-US"/>
           </a:p>
         </p:txBody>
       </p:sp>
@@ -2757,10 +2760,9 @@
           </a:lstStyle>
           <a:p>
             <a:r>
-              <a:rPr lang="en-US" smtClean="0"/>
+              <a:rPr lang="en-US"/>
               <a:t>Click to edit Master title style</a:t>
             </a:r>
-            <a:endParaRPr lang="en-US"/>
           </a:p>
         </p:txBody>
       </p:sp>
@@ -2814,38 +2816,37 @@
           <a:p>
             <a:pPr lvl="0"/>
             <a:r>
-              <a:rPr lang="en-US" smtClean="0"/>
+              <a:rPr lang="en-US"/>
               <a:t>Click to edit Master text styles</a:t>
             </a:r>
           </a:p>
           <a:p>
             <a:pPr lvl="1"/>
             <a:r>
-              <a:rPr lang="en-US" smtClean="0"/>
+              <a:rPr lang="en-US"/>
               <a:t>Second level</a:t>
             </a:r>
           </a:p>
           <a:p>
             <a:pPr lvl="2"/>
             <a:r>
-              <a:rPr lang="en-US" smtClean="0"/>
+              <a:rPr lang="en-US"/>
               <a:t>Third level</a:t>
             </a:r>
           </a:p>
           <a:p>
             <a:pPr lvl="3"/>
             <a:r>
-              <a:rPr lang="en-US" smtClean="0"/>
+              <a:rPr lang="en-US"/>
               <a:t>Fourth level</a:t>
             </a:r>
           </a:p>
           <a:p>
             <a:pPr lvl="4"/>
             <a:r>
-              <a:rPr lang="en-US" smtClean="0"/>
+              <a:rPr lang="en-US"/>
               <a:t>Fifth level</a:t>
             </a:r>
-            <a:endParaRPr lang="en-US"/>
           </a:p>
         </p:txBody>
       </p:sp>
@@ -2908,7 +2909,7 @@
           <a:p>
             <a:pPr lvl="0"/>
             <a:r>
-              <a:rPr lang="en-US" smtClean="0"/>
+              <a:rPr lang="en-US"/>
               <a:t>Click to edit Master text styles</a:t>
             </a:r>
           </a:p>
@@ -3038,10 +3039,9 @@
           </a:lstStyle>
           <a:p>
             <a:r>
-              <a:rPr lang="en-US" smtClean="0"/>
+              <a:rPr lang="en-US"/>
               <a:t>Click to edit Master title style</a:t>
             </a:r>
-            <a:endParaRPr lang="en-US"/>
           </a:p>
         </p:txBody>
       </p:sp>
@@ -3103,10 +3103,9 @@
           </a:lstStyle>
           <a:p>
             <a:r>
-              <a:rPr lang="en-US" smtClean="0"/>
+              <a:rPr lang="en-US"/>
               <a:t>Drag picture to placeholder or click icon to add</a:t>
             </a:r>
-            <a:endParaRPr lang="en-US"/>
           </a:p>
         </p:txBody>
       </p:sp>
@@ -3169,7 +3168,7 @@
           <a:p>
             <a:pPr lvl="0"/>
             <a:r>
-              <a:rPr lang="en-US" smtClean="0"/>
+              <a:rPr lang="en-US"/>
               <a:t>Click to edit Master text styles</a:t>
             </a:r>
           </a:p>
@@ -3323,10 +3322,9 @@
           <a:p>
             <a:pPr lvl="0"/>
             <a:r>
-              <a:rPr lang="en-US" smtClean="0"/>
+              <a:rPr lang="en-US"/>
               <a:t>Click to edit Master title style</a:t>
             </a:r>
-            <a:endParaRPr lang="en-US"/>
           </a:p>
         </p:txBody>
       </p:sp>
@@ -3367,38 +3365,37 @@
           <a:p>
             <a:pPr lvl="0"/>
             <a:r>
-              <a:rPr lang="en-US" smtClean="0"/>
+              <a:rPr lang="en-US"/>
               <a:t>Click to edit Master text styles</a:t>
             </a:r>
           </a:p>
           <a:p>
             <a:pPr lvl="1"/>
             <a:r>
-              <a:rPr lang="en-US" smtClean="0"/>
+              <a:rPr lang="en-US"/>
               <a:t>Second level</a:t>
             </a:r>
           </a:p>
           <a:p>
             <a:pPr lvl="2"/>
             <a:r>
-              <a:rPr lang="en-US" smtClean="0"/>
+              <a:rPr lang="en-US"/>
               <a:t>Third level</a:t>
             </a:r>
           </a:p>
           <a:p>
             <a:pPr lvl="3"/>
             <a:r>
-              <a:rPr lang="en-US" smtClean="0"/>
+              <a:rPr lang="en-US"/>
               <a:t>Fourth level</a:t>
             </a:r>
           </a:p>
           <a:p>
             <a:pPr lvl="4"/>
             <a:r>
-              <a:rPr lang="en-US" smtClean="0"/>
+              <a:rPr lang="en-US"/>
               <a:t>Fifth level</a:t>
             </a:r>
-            <a:endParaRPr lang="en-US"/>
           </a:p>
         </p:txBody>
       </p:sp>
@@ -4176,10 +4173,9 @@
           <a:lstStyle/>
           <a:p>
             <a:r>
-              <a:rPr lang="en-US" dirty="0" smtClean="0"/>
+              <a:rPr lang="en-US" dirty="0"/>
               <a:t>Computational Cognitive Neuroscience</a:t>
             </a:r>
-            <a:endParaRPr lang="en-US" dirty="0"/>
           </a:p>
         </p:txBody>
       </p:sp>
@@ -4199,16 +4195,15 @@
           <a:lstStyle/>
           <a:p>
             <a:r>
-              <a:rPr lang="en-US" dirty="0" smtClean="0"/>
-              <a:t>PSYC 4175/5175</a:t>
-            </a:r>
-          </a:p>
-          <a:p>
-            <a:r>
-              <a:rPr lang="en-US" dirty="0" smtClean="0"/>
+              <a:rPr lang="en-US" dirty="0"/>
               <a:t>Randall O’Reilly</a:t>
             </a:r>
-            <a:endParaRPr lang="en-US" dirty="0"/>
+          </a:p>
+          <a:p>
+            <a:r>
+              <a:rPr lang="en-US" dirty="0"/>
+              <a:t>UC Davis</a:t>
+            </a:r>
           </a:p>
         </p:txBody>
       </p:sp>
@@ -4258,10 +4253,9 @@
           <a:lstStyle/>
           <a:p>
             <a:r>
-              <a:rPr lang="en-US" dirty="0" smtClean="0"/>
+              <a:rPr lang="en-US" dirty="0"/>
               <a:t>Course Overview</a:t>
             </a:r>
-            <a:endParaRPr lang="en-US" dirty="0"/>
           </a:p>
         </p:txBody>
       </p:sp>
@@ -4286,10 +4280,9 @@
           <a:lstStyle/>
           <a:p>
             <a:r>
-              <a:rPr lang="en-US" dirty="0" smtClean="0"/>
+              <a:rPr lang="en-US" dirty="0"/>
               <a:t>From Neurons to Networks to the Brain/Mind..</a:t>
             </a:r>
-            <a:endParaRPr lang="en-US" dirty="0"/>
           </a:p>
         </p:txBody>
       </p:sp>
@@ -4404,10 +4397,9 @@
           <a:lstStyle/>
           <a:p>
             <a:r>
-              <a:rPr lang="en-US" dirty="0" smtClean="0"/>
+              <a:rPr lang="en-US" dirty="0"/>
               <a:t>Cognitive Phenomena</a:t>
             </a:r>
-            <a:endParaRPr lang="en-US" dirty="0"/>
           </a:p>
         </p:txBody>
       </p:sp>
@@ -4531,10 +4523,9 @@
           <a:lstStyle/>
           <a:p>
             <a:r>
-              <a:rPr lang="en-US" dirty="0" smtClean="0"/>
+              <a:rPr lang="en-US" dirty="0"/>
               <a:t>Cognitive Phenomena</a:t>
             </a:r>
-            <a:endParaRPr lang="en-US" dirty="0"/>
           </a:p>
         </p:txBody>
       </p:sp>
@@ -4659,10 +4650,9 @@
           <a:lstStyle/>
           <a:p>
             <a:r>
-              <a:rPr lang="en-US" dirty="0" smtClean="0"/>
+              <a:rPr lang="en-US" dirty="0"/>
               <a:t>How Would You Build It?</a:t>
             </a:r>
-            <a:endParaRPr lang="en-US" dirty="0"/>
           </a:p>
         </p:txBody>
       </p:sp>
@@ -4682,24 +4672,24 @@
           <a:lstStyle/>
           <a:p>
             <a:r>
-              <a:rPr lang="en-US" dirty="0" smtClean="0"/>
+              <a:rPr lang="en-US" dirty="0"/>
               <a:t>If you want to understand how something works, take it apart, then </a:t>
             </a:r>
             <a:r>
-              <a:rPr lang="en-US" i="1" dirty="0" smtClean="0"/>
+              <a:rPr lang="en-US" i="1" dirty="0"/>
               <a:t>try to put it back together.</a:t>
             </a:r>
-            <a:endParaRPr lang="en-US" dirty="0" smtClean="0"/>
-          </a:p>
-          <a:p>
-            <a:r>
-              <a:rPr lang="en-US" dirty="0" smtClean="0"/>
+            <a:endParaRPr lang="en-US" dirty="0"/>
+          </a:p>
+          <a:p>
+            <a:r>
+              <a:rPr lang="en-US" dirty="0"/>
               <a:t>We’re going to take the brain apart, an put it back together again.</a:t>
             </a:r>
           </a:p>
           <a:p>
             <a:r>
-              <a:rPr lang="en-US" dirty="0" smtClean="0"/>
+              <a:rPr lang="en-US" dirty="0"/>
               <a:t>How would you do it??</a:t>
             </a:r>
           </a:p>
@@ -4751,10 +4741,9 @@
           <a:lstStyle/>
           <a:p>
             <a:r>
-              <a:rPr lang="en-US" dirty="0" smtClean="0"/>
+              <a:rPr lang="en-US" dirty="0"/>
               <a:t>Emergence and Learning</a:t>
             </a:r>
-            <a:endParaRPr lang="en-US" dirty="0"/>
           </a:p>
         </p:txBody>
       </p:sp>
@@ -4774,22 +4763,21 @@
           <a:lstStyle/>
           <a:p>
             <a:r>
-              <a:rPr lang="en-US" dirty="0" smtClean="0"/>
+              <a:rPr lang="en-US" dirty="0"/>
               <a:t>With 10,000,000,000 neurons, you can’t build it by hand..</a:t>
             </a:r>
           </a:p>
           <a:p>
             <a:r>
-              <a:rPr lang="en-US" dirty="0" smtClean="0"/>
+              <a:rPr lang="en-US" dirty="0"/>
               <a:t>It basically has to build itself (development &amp; learning)</a:t>
             </a:r>
           </a:p>
           <a:p>
             <a:r>
-              <a:rPr lang="en-US" dirty="0" smtClean="0"/>
+              <a:rPr lang="en-US" dirty="0"/>
               <a:t>Complexity must emerge from simplicity (not that many genes control brain development..)</a:t>
             </a:r>
-            <a:endParaRPr lang="en-US" dirty="0"/>
           </a:p>
         </p:txBody>
       </p:sp>
@@ -4839,10 +4827,9 @@
           <a:lstStyle/>
           <a:p>
             <a:r>
-              <a:rPr lang="en-US" dirty="0" smtClean="0"/>
+              <a:rPr lang="en-US" dirty="0"/>
               <a:t>Emergence</a:t>
             </a:r>
-            <a:endParaRPr lang="en-US" dirty="0"/>
           </a:p>
         </p:txBody>
       </p:sp>
@@ -4897,14 +4884,13 @@
           <a:lstStyle/>
           <a:p>
             <a:r>
-              <a:rPr lang="en-US" dirty="0" smtClean="0"/>
+              <a:rPr lang="en-US" dirty="0"/>
               <a:t>(Now Imagine 10,000,000,000 gears, each interacting with </a:t>
             </a:r>
             <a:r>
-              <a:rPr lang="en-US" smtClean="0"/>
+              <a:rPr lang="en-US"/>
               <a:t>10,000 others..</a:t>
             </a:r>
-            <a:endParaRPr lang="en-US"/>
           </a:p>
         </p:txBody>
       </p:sp>
@@ -4959,10 +4945,9 @@
           <a:lstStyle/>
           <a:p>
             <a:r>
-              <a:rPr lang="en-US" dirty="0" smtClean="0"/>
+              <a:rPr lang="en-US" dirty="0"/>
               <a:t>The Problem</a:t>
             </a:r>
-            <a:endParaRPr lang="en-US" dirty="0"/>
           </a:p>
         </p:txBody>
       </p:sp>
@@ -5005,13 +4990,6 @@
   <p:clrMapOvr>
     <a:masterClrMapping/>
   </p:clrMapOvr>
-  <p:timing>
-    <p:tnLst>
-      <p:par>
-        <p:cTn xmlns:p14="http://schemas.microsoft.com/office/powerpoint/2010/main" id="1" dur="indefinite" restart="never" nodeType="tmRoot"/>
-      </p:par>
-    </p:tnLst>
-  </p:timing>
 </p:sld>
 </file>
 
@@ -5053,10 +5031,9 @@
           <a:lstStyle/>
           <a:p>
             <a:r>
-              <a:rPr lang="en-US" dirty="0" smtClean="0"/>
+              <a:rPr lang="en-US" dirty="0"/>
               <a:t>The Problem</a:t>
             </a:r>
-            <a:endParaRPr lang="en-US" dirty="0"/>
           </a:p>
         </p:txBody>
       </p:sp>
@@ -5098,13 +5075,6 @@
   <p:clrMapOvr>
     <a:masterClrMapping/>
   </p:clrMapOvr>
-  <p:timing>
-    <p:tnLst>
-      <p:par>
-        <p:cTn xmlns:p14="http://schemas.microsoft.com/office/powerpoint/2010/main" id="1" dur="indefinite" restart="never" nodeType="tmRoot"/>
-      </p:par>
-    </p:tnLst>
-  </p:timing>
 </p:sld>
 </file>
 
@@ -5146,10 +5116,9 @@
           <a:lstStyle/>
           <a:p>
             <a:r>
-              <a:rPr lang="en-US" dirty="0" smtClean="0"/>
+              <a:rPr lang="en-US" dirty="0"/>
               <a:t>Behavioral Constraints</a:t>
             </a:r>
-            <a:endParaRPr lang="en-US" dirty="0"/>
           </a:p>
         </p:txBody>
       </p:sp>
@@ -5192,13 +5161,6 @@
   <p:clrMapOvr>
     <a:masterClrMapping/>
   </p:clrMapOvr>
-  <p:timing>
-    <p:tnLst>
-      <p:par>
-        <p:cTn xmlns:p14="http://schemas.microsoft.com/office/powerpoint/2010/main" id="1" dur="indefinite" restart="never" nodeType="tmRoot"/>
-      </p:par>
-    </p:tnLst>
-  </p:timing>
 </p:sld>
 </file>
 
@@ -5240,14 +5202,13 @@
           <a:lstStyle/>
           <a:p>
             <a:r>
-              <a:rPr lang="en-US" dirty="0" err="1" smtClean="0"/>
+              <a:rPr lang="en-US" dirty="0" err="1"/>
               <a:t>Neuro</a:t>
             </a:r>
             <a:r>
-              <a:rPr lang="en-US" dirty="0" smtClean="0"/>
+              <a:rPr lang="en-US" dirty="0"/>
               <a:t> + Behavioral Constraints</a:t>
             </a:r>
-            <a:endParaRPr lang="en-US" dirty="0"/>
           </a:p>
         </p:txBody>
       </p:sp>
@@ -5290,13 +5251,6 @@
   <p:clrMapOvr>
     <a:masterClrMapping/>
   </p:clrMapOvr>
-  <p:timing>
-    <p:tnLst>
-      <p:par>
-        <p:cTn xmlns:p14="http://schemas.microsoft.com/office/powerpoint/2010/main" id="1" dur="indefinite" restart="never" nodeType="tmRoot"/>
-      </p:par>
-    </p:tnLst>
-  </p:timing>
 </p:sld>
 </file>
 
@@ -5338,10 +5292,9 @@
           <a:lstStyle/>
           <a:p>
             <a:r>
-              <a:rPr lang="en-US" dirty="0" smtClean="0"/>
+              <a:rPr lang="en-US" dirty="0"/>
               <a:t>Messy Puzzles are Easier to Solve!!</a:t>
             </a:r>
-            <a:endParaRPr lang="en-US" dirty="0"/>
           </a:p>
         </p:txBody>
       </p:sp>
@@ -5384,13 +5337,6 @@
   <p:clrMapOvr>
     <a:masterClrMapping/>
   </p:clrMapOvr>
-  <p:timing>
-    <p:tnLst>
-      <p:par>
-        <p:cTn xmlns:p14="http://schemas.microsoft.com/office/powerpoint/2010/main" id="1" dur="indefinite" restart="never" nodeType="tmRoot"/>
-      </p:par>
-    </p:tnLst>
-  </p:timing>
 </p:sld>
 </file>
 

</xml_diff>